<commit_message>
feat(1255): update doc to add BoaviztAPI link to github
</commit_message>
<xml_diff>
--- a/services/documentation/content/2-functional-documentation/use_cases/uc_navigation_menu/images/Welcome page.pptx
+++ b/services/documentation/content/2-functional-documentation/use_cases/uc_navigation_menu/images/Welcome page.pptx
@@ -6,8 +6,9 @@
   </p:sldMasterIdLst>
   <p:sldIdLst>
     <p:sldId id="256" r:id="rId2"/>
-    <p:sldId id="257" r:id="rId3"/>
-    <p:sldId id="258" r:id="rId4"/>
+    <p:sldId id="259" r:id="rId3"/>
+    <p:sldId id="260" r:id="rId4"/>
+    <p:sldId id="261" r:id="rId5"/>
   </p:sldIdLst>
   <p:sldSz cx="12192000" cy="6858000"/>
   <p:notesSz cx="6858000" cy="9144000"/>
@@ -261,7 +262,7 @@
           <a:p>
             <a:fld id="{2A96524B-D42B-4755-AF1B-D5286D88505C}" type="datetimeFigureOut">
               <a:rPr lang="en-US" smtClean="0"/>
-              <a:t>5/30/2025</a:t>
+              <a:t>7/9/2025</a:t>
             </a:fld>
             <a:endParaRPr lang="en-US"/>
           </a:p>
@@ -459,7 +460,7 @@
           <a:p>
             <a:fld id="{2A96524B-D42B-4755-AF1B-D5286D88505C}" type="datetimeFigureOut">
               <a:rPr lang="en-US" smtClean="0"/>
-              <a:t>5/30/2025</a:t>
+              <a:t>7/9/2025</a:t>
             </a:fld>
             <a:endParaRPr lang="en-US"/>
           </a:p>
@@ -667,7 +668,7 @@
           <a:p>
             <a:fld id="{2A96524B-D42B-4755-AF1B-D5286D88505C}" type="datetimeFigureOut">
               <a:rPr lang="en-US" smtClean="0"/>
-              <a:t>5/30/2025</a:t>
+              <a:t>7/9/2025</a:t>
             </a:fld>
             <a:endParaRPr lang="en-US"/>
           </a:p>
@@ -865,7 +866,7 @@
           <a:p>
             <a:fld id="{2A96524B-D42B-4755-AF1B-D5286D88505C}" type="datetimeFigureOut">
               <a:rPr lang="en-US" smtClean="0"/>
-              <a:t>5/30/2025</a:t>
+              <a:t>7/9/2025</a:t>
             </a:fld>
             <a:endParaRPr lang="en-US"/>
           </a:p>
@@ -1140,7 +1141,7 @@
           <a:p>
             <a:fld id="{2A96524B-D42B-4755-AF1B-D5286D88505C}" type="datetimeFigureOut">
               <a:rPr lang="en-US" smtClean="0"/>
-              <a:t>5/30/2025</a:t>
+              <a:t>7/9/2025</a:t>
             </a:fld>
             <a:endParaRPr lang="en-US"/>
           </a:p>
@@ -1405,7 +1406,7 @@
           <a:p>
             <a:fld id="{2A96524B-D42B-4755-AF1B-D5286D88505C}" type="datetimeFigureOut">
               <a:rPr lang="en-US" smtClean="0"/>
-              <a:t>5/30/2025</a:t>
+              <a:t>7/9/2025</a:t>
             </a:fld>
             <a:endParaRPr lang="en-US"/>
           </a:p>
@@ -1817,7 +1818,7 @@
           <a:p>
             <a:fld id="{2A96524B-D42B-4755-AF1B-D5286D88505C}" type="datetimeFigureOut">
               <a:rPr lang="en-US" smtClean="0"/>
-              <a:t>5/30/2025</a:t>
+              <a:t>7/9/2025</a:t>
             </a:fld>
             <a:endParaRPr lang="en-US"/>
           </a:p>
@@ -1958,7 +1959,7 @@
           <a:p>
             <a:fld id="{2A96524B-D42B-4755-AF1B-D5286D88505C}" type="datetimeFigureOut">
               <a:rPr lang="en-US" smtClean="0"/>
-              <a:t>5/30/2025</a:t>
+              <a:t>7/9/2025</a:t>
             </a:fld>
             <a:endParaRPr lang="en-US"/>
           </a:p>
@@ -2071,7 +2072,7 @@
           <a:p>
             <a:fld id="{2A96524B-D42B-4755-AF1B-D5286D88505C}" type="datetimeFigureOut">
               <a:rPr lang="en-US" smtClean="0"/>
-              <a:t>5/30/2025</a:t>
+              <a:t>7/9/2025</a:t>
             </a:fld>
             <a:endParaRPr lang="en-US"/>
           </a:p>
@@ -2382,7 +2383,7 @@
           <a:p>
             <a:fld id="{2A96524B-D42B-4755-AF1B-D5286D88505C}" type="datetimeFigureOut">
               <a:rPr lang="en-US" smtClean="0"/>
-              <a:t>5/30/2025</a:t>
+              <a:t>7/9/2025</a:t>
             </a:fld>
             <a:endParaRPr lang="en-US"/>
           </a:p>
@@ -2670,7 +2671,7 @@
           <a:p>
             <a:fld id="{2A96524B-D42B-4755-AF1B-D5286D88505C}" type="datetimeFigureOut">
               <a:rPr lang="en-US" smtClean="0"/>
-              <a:t>5/30/2025</a:t>
+              <a:t>7/9/2025</a:t>
             </a:fld>
             <a:endParaRPr lang="en-US"/>
           </a:p>
@@ -2911,7 +2912,7 @@
           <a:p>
             <a:fld id="{2A96524B-D42B-4755-AF1B-D5286D88505C}" type="datetimeFigureOut">
               <a:rPr lang="en-US" smtClean="0"/>
-              <a:t>5/30/2025</a:t>
+              <a:t>7/9/2025</a:t>
             </a:fld>
             <a:endParaRPr lang="en-US"/>
           </a:p>
@@ -5026,7 +5027,13 @@
   <p:cSld>
     <p:spTree>
       <p:nvGrpSpPr>
-        <p:cNvPr id="1" name=""/>
+        <p:cNvPr id="1" name="">
+          <a:extLst>
+            <a:ext uri="{FF2B5EF4-FFF2-40B4-BE49-F238E27FC236}">
+              <a16:creationId xmlns:a16="http://schemas.microsoft.com/office/drawing/2014/main" id="{87B348BC-396E-3799-97CD-F0C2968E8376}"/>
+            </a:ext>
+          </a:extLst>
+        </p:cNvPr>
         <p:cNvGrpSpPr/>
         <p:nvPr/>
       </p:nvGrpSpPr>
@@ -5040,10 +5047,10 @@
       </p:grpSpPr>
       <p:pic>
         <p:nvPicPr>
-          <p:cNvPr id="5" name="Picture 4">
-            <a:extLst>
-              <a:ext uri="{FF2B5EF4-FFF2-40B4-BE49-F238E27FC236}">
-                <a16:creationId xmlns:a16="http://schemas.microsoft.com/office/drawing/2014/main" id="{4B6CB693-569A-26C3-C545-8A1E6EF96462}"/>
+          <p:cNvPr id="10" name="Picture 9" descr="A screenshot of a computer&#10;&#10;AI-generated content may be incorrect.">
+            <a:extLst>
+              <a:ext uri="{FF2B5EF4-FFF2-40B4-BE49-F238E27FC236}">
+                <a16:creationId xmlns:a16="http://schemas.microsoft.com/office/drawing/2014/main" id="{8322BBA5-BF24-E13A-EDB1-6217010F3AFF}"/>
               </a:ext>
             </a:extLst>
           </p:cNvPr>
@@ -5053,25 +5060,1630 @@
           <p:nvPr/>
         </p:nvPicPr>
         <p:blipFill>
-          <a:blip r:embed="rId2"/>
-          <a:stretch>
-            <a:fillRect/>
-          </a:stretch>
+          <a:blip r:embed="rId2">
+            <a:extLst>
+              <a:ext uri="{28A0092B-C50C-407E-A947-70E740481C1C}">
+                <a14:useLocalDpi xmlns:a14="http://schemas.microsoft.com/office/drawing/2010/main" val="0"/>
+              </a:ext>
+            </a:extLst>
+          </a:blip>
+          <a:srcRect t="18364"/>
+          <a:stretch/>
         </p:blipFill>
         <p:spPr>
           <a:xfrm>
-            <a:off x="6037" y="34750"/>
-            <a:ext cx="12179926" cy="6788499"/>
+            <a:off x="0" y="560145"/>
+            <a:ext cx="12192000" cy="5225361"/>
           </a:xfrm>
           <a:prstGeom prst="rect">
             <a:avLst/>
           </a:prstGeom>
         </p:spPr>
       </p:pic>
+      <p:sp>
+        <p:nvSpPr>
+          <p:cNvPr id="4" name="Rectangle : coins arrondis 4">
+            <a:extLst>
+              <a:ext uri="{FF2B5EF4-FFF2-40B4-BE49-F238E27FC236}">
+                <a16:creationId xmlns:a16="http://schemas.microsoft.com/office/drawing/2014/main" id="{010DCE0D-2D95-33D0-12D9-F475788D6B3C}"/>
+              </a:ext>
+            </a:extLst>
+          </p:cNvPr>
+          <p:cNvSpPr/>
+          <p:nvPr/>
+        </p:nvSpPr>
+        <p:spPr>
+          <a:xfrm>
+            <a:off x="505123" y="873888"/>
+            <a:ext cx="195803" cy="166442"/>
+          </a:xfrm>
+          <a:prstGeom prst="roundRect">
+            <a:avLst/>
+          </a:prstGeom>
+          <a:solidFill>
+            <a:schemeClr val="accent5"/>
+          </a:solidFill>
+        </p:spPr>
+        <p:style>
+          <a:lnRef idx="2">
+            <a:schemeClr val="accent1">
+              <a:shade val="15000"/>
+            </a:schemeClr>
+          </a:lnRef>
+          <a:fillRef idx="1">
+            <a:schemeClr val="accent1"/>
+          </a:fillRef>
+          <a:effectRef idx="0">
+            <a:schemeClr val="accent1"/>
+          </a:effectRef>
+          <a:fontRef idx="minor">
+            <a:schemeClr val="lt1"/>
+          </a:fontRef>
+        </p:style>
+        <p:txBody>
+          <a:bodyPr rtlCol="0" anchor="ctr"/>
+          <a:lstStyle>
+            <a:defPPr>
+              <a:defRPr lang="fr-FR"/>
+            </a:defPPr>
+            <a:lvl1pPr marL="0" algn="l" defTabSz="914400" rtl="0" eaLnBrk="1" latinLnBrk="0" hangingPunct="1">
+              <a:defRPr sz="1800" kern="1200">
+                <a:solidFill>
+                  <a:schemeClr val="lt1"/>
+                </a:solidFill>
+                <a:latin typeface="+mn-lt"/>
+                <a:ea typeface="+mn-ea"/>
+                <a:cs typeface="+mn-cs"/>
+              </a:defRPr>
+            </a:lvl1pPr>
+            <a:lvl2pPr marL="457200" algn="l" defTabSz="914400" rtl="0" eaLnBrk="1" latinLnBrk="0" hangingPunct="1">
+              <a:defRPr sz="1800" kern="1200">
+                <a:solidFill>
+                  <a:schemeClr val="lt1"/>
+                </a:solidFill>
+                <a:latin typeface="+mn-lt"/>
+                <a:ea typeface="+mn-ea"/>
+                <a:cs typeface="+mn-cs"/>
+              </a:defRPr>
+            </a:lvl2pPr>
+            <a:lvl3pPr marL="914400" algn="l" defTabSz="914400" rtl="0" eaLnBrk="1" latinLnBrk="0" hangingPunct="1">
+              <a:defRPr sz="1800" kern="1200">
+                <a:solidFill>
+                  <a:schemeClr val="lt1"/>
+                </a:solidFill>
+                <a:latin typeface="+mn-lt"/>
+                <a:ea typeface="+mn-ea"/>
+                <a:cs typeface="+mn-cs"/>
+              </a:defRPr>
+            </a:lvl3pPr>
+            <a:lvl4pPr marL="1371600" algn="l" defTabSz="914400" rtl="0" eaLnBrk="1" latinLnBrk="0" hangingPunct="1">
+              <a:defRPr sz="1800" kern="1200">
+                <a:solidFill>
+                  <a:schemeClr val="lt1"/>
+                </a:solidFill>
+                <a:latin typeface="+mn-lt"/>
+                <a:ea typeface="+mn-ea"/>
+                <a:cs typeface="+mn-cs"/>
+              </a:defRPr>
+            </a:lvl4pPr>
+            <a:lvl5pPr marL="1828800" algn="l" defTabSz="914400" rtl="0" eaLnBrk="1" latinLnBrk="0" hangingPunct="1">
+              <a:defRPr sz="1800" kern="1200">
+                <a:solidFill>
+                  <a:schemeClr val="lt1"/>
+                </a:solidFill>
+                <a:latin typeface="+mn-lt"/>
+                <a:ea typeface="+mn-ea"/>
+                <a:cs typeface="+mn-cs"/>
+              </a:defRPr>
+            </a:lvl5pPr>
+            <a:lvl6pPr marL="2286000" algn="l" defTabSz="914400" rtl="0" eaLnBrk="1" latinLnBrk="0" hangingPunct="1">
+              <a:defRPr sz="1800" kern="1200">
+                <a:solidFill>
+                  <a:schemeClr val="lt1"/>
+                </a:solidFill>
+                <a:latin typeface="+mn-lt"/>
+                <a:ea typeface="+mn-ea"/>
+                <a:cs typeface="+mn-cs"/>
+              </a:defRPr>
+            </a:lvl6pPr>
+            <a:lvl7pPr marL="2743200" algn="l" defTabSz="914400" rtl="0" eaLnBrk="1" latinLnBrk="0" hangingPunct="1">
+              <a:defRPr sz="1800" kern="1200">
+                <a:solidFill>
+                  <a:schemeClr val="lt1"/>
+                </a:solidFill>
+                <a:latin typeface="+mn-lt"/>
+                <a:ea typeface="+mn-ea"/>
+                <a:cs typeface="+mn-cs"/>
+              </a:defRPr>
+            </a:lvl7pPr>
+            <a:lvl8pPr marL="3200400" algn="l" defTabSz="914400" rtl="0" eaLnBrk="1" latinLnBrk="0" hangingPunct="1">
+              <a:defRPr sz="1800" kern="1200">
+                <a:solidFill>
+                  <a:schemeClr val="lt1"/>
+                </a:solidFill>
+                <a:latin typeface="+mn-lt"/>
+                <a:ea typeface="+mn-ea"/>
+                <a:cs typeface="+mn-cs"/>
+              </a:defRPr>
+            </a:lvl8pPr>
+            <a:lvl9pPr marL="3657600" algn="l" defTabSz="914400" rtl="0" eaLnBrk="1" latinLnBrk="0" hangingPunct="1">
+              <a:defRPr sz="1800" kern="1200">
+                <a:solidFill>
+                  <a:schemeClr val="lt1"/>
+                </a:solidFill>
+                <a:latin typeface="+mn-lt"/>
+                <a:ea typeface="+mn-ea"/>
+                <a:cs typeface="+mn-cs"/>
+              </a:defRPr>
+            </a:lvl9pPr>
+          </a:lstStyle>
+          <a:p>
+            <a:pPr algn="ctr"/>
+            <a:r>
+              <a:rPr lang="fr-FR" sz="1400" dirty="0"/>
+              <a:t>1</a:t>
+            </a:r>
+          </a:p>
+        </p:txBody>
+      </p:sp>
+      <p:sp>
+        <p:nvSpPr>
+          <p:cNvPr id="6" name="Rectangle : coins arrondis 4">
+            <a:extLst>
+              <a:ext uri="{FF2B5EF4-FFF2-40B4-BE49-F238E27FC236}">
+                <a16:creationId xmlns:a16="http://schemas.microsoft.com/office/drawing/2014/main" id="{9390E5C3-63E9-3C34-FD70-DEB88679C904}"/>
+              </a:ext>
+            </a:extLst>
+          </p:cNvPr>
+          <p:cNvSpPr/>
+          <p:nvPr/>
+        </p:nvSpPr>
+        <p:spPr>
+          <a:xfrm>
+            <a:off x="424980" y="2046563"/>
+            <a:ext cx="195803" cy="166442"/>
+          </a:xfrm>
+          <a:prstGeom prst="roundRect">
+            <a:avLst/>
+          </a:prstGeom>
+          <a:solidFill>
+            <a:schemeClr val="accent5"/>
+          </a:solidFill>
+        </p:spPr>
+        <p:style>
+          <a:lnRef idx="2">
+            <a:schemeClr val="accent1">
+              <a:shade val="15000"/>
+            </a:schemeClr>
+          </a:lnRef>
+          <a:fillRef idx="1">
+            <a:schemeClr val="accent1"/>
+          </a:fillRef>
+          <a:effectRef idx="0">
+            <a:schemeClr val="accent1"/>
+          </a:effectRef>
+          <a:fontRef idx="minor">
+            <a:schemeClr val="lt1"/>
+          </a:fontRef>
+        </p:style>
+        <p:txBody>
+          <a:bodyPr rtlCol="0" anchor="ctr"/>
+          <a:lstStyle>
+            <a:defPPr>
+              <a:defRPr lang="fr-FR"/>
+            </a:defPPr>
+            <a:lvl1pPr marL="0" algn="l" defTabSz="914400" rtl="0" eaLnBrk="1" latinLnBrk="0" hangingPunct="1">
+              <a:defRPr sz="1800" kern="1200">
+                <a:solidFill>
+                  <a:schemeClr val="lt1"/>
+                </a:solidFill>
+                <a:latin typeface="+mn-lt"/>
+                <a:ea typeface="+mn-ea"/>
+                <a:cs typeface="+mn-cs"/>
+              </a:defRPr>
+            </a:lvl1pPr>
+            <a:lvl2pPr marL="457200" algn="l" defTabSz="914400" rtl="0" eaLnBrk="1" latinLnBrk="0" hangingPunct="1">
+              <a:defRPr sz="1800" kern="1200">
+                <a:solidFill>
+                  <a:schemeClr val="lt1"/>
+                </a:solidFill>
+                <a:latin typeface="+mn-lt"/>
+                <a:ea typeface="+mn-ea"/>
+                <a:cs typeface="+mn-cs"/>
+              </a:defRPr>
+            </a:lvl2pPr>
+            <a:lvl3pPr marL="914400" algn="l" defTabSz="914400" rtl="0" eaLnBrk="1" latinLnBrk="0" hangingPunct="1">
+              <a:defRPr sz="1800" kern="1200">
+                <a:solidFill>
+                  <a:schemeClr val="lt1"/>
+                </a:solidFill>
+                <a:latin typeface="+mn-lt"/>
+                <a:ea typeface="+mn-ea"/>
+                <a:cs typeface="+mn-cs"/>
+              </a:defRPr>
+            </a:lvl3pPr>
+            <a:lvl4pPr marL="1371600" algn="l" defTabSz="914400" rtl="0" eaLnBrk="1" latinLnBrk="0" hangingPunct="1">
+              <a:defRPr sz="1800" kern="1200">
+                <a:solidFill>
+                  <a:schemeClr val="lt1"/>
+                </a:solidFill>
+                <a:latin typeface="+mn-lt"/>
+                <a:ea typeface="+mn-ea"/>
+                <a:cs typeface="+mn-cs"/>
+              </a:defRPr>
+            </a:lvl4pPr>
+            <a:lvl5pPr marL="1828800" algn="l" defTabSz="914400" rtl="0" eaLnBrk="1" latinLnBrk="0" hangingPunct="1">
+              <a:defRPr sz="1800" kern="1200">
+                <a:solidFill>
+                  <a:schemeClr val="lt1"/>
+                </a:solidFill>
+                <a:latin typeface="+mn-lt"/>
+                <a:ea typeface="+mn-ea"/>
+                <a:cs typeface="+mn-cs"/>
+              </a:defRPr>
+            </a:lvl5pPr>
+            <a:lvl6pPr marL="2286000" algn="l" defTabSz="914400" rtl="0" eaLnBrk="1" latinLnBrk="0" hangingPunct="1">
+              <a:defRPr sz="1800" kern="1200">
+                <a:solidFill>
+                  <a:schemeClr val="lt1"/>
+                </a:solidFill>
+                <a:latin typeface="+mn-lt"/>
+                <a:ea typeface="+mn-ea"/>
+                <a:cs typeface="+mn-cs"/>
+              </a:defRPr>
+            </a:lvl6pPr>
+            <a:lvl7pPr marL="2743200" algn="l" defTabSz="914400" rtl="0" eaLnBrk="1" latinLnBrk="0" hangingPunct="1">
+              <a:defRPr sz="1800" kern="1200">
+                <a:solidFill>
+                  <a:schemeClr val="lt1"/>
+                </a:solidFill>
+                <a:latin typeface="+mn-lt"/>
+                <a:ea typeface="+mn-ea"/>
+                <a:cs typeface="+mn-cs"/>
+              </a:defRPr>
+            </a:lvl7pPr>
+            <a:lvl8pPr marL="3200400" algn="l" defTabSz="914400" rtl="0" eaLnBrk="1" latinLnBrk="0" hangingPunct="1">
+              <a:defRPr sz="1800" kern="1200">
+                <a:solidFill>
+                  <a:schemeClr val="lt1"/>
+                </a:solidFill>
+                <a:latin typeface="+mn-lt"/>
+                <a:ea typeface="+mn-ea"/>
+                <a:cs typeface="+mn-cs"/>
+              </a:defRPr>
+            </a:lvl8pPr>
+            <a:lvl9pPr marL="3657600" algn="l" defTabSz="914400" rtl="0" eaLnBrk="1" latinLnBrk="0" hangingPunct="1">
+              <a:defRPr sz="1800" kern="1200">
+                <a:solidFill>
+                  <a:schemeClr val="lt1"/>
+                </a:solidFill>
+                <a:latin typeface="+mn-lt"/>
+                <a:ea typeface="+mn-ea"/>
+                <a:cs typeface="+mn-cs"/>
+              </a:defRPr>
+            </a:lvl9pPr>
+          </a:lstStyle>
+          <a:p>
+            <a:pPr algn="ctr"/>
+            <a:r>
+              <a:rPr lang="fr-FR" sz="1400" dirty="0"/>
+              <a:t>2</a:t>
+            </a:r>
+          </a:p>
+        </p:txBody>
+      </p:sp>
+      <p:sp>
+        <p:nvSpPr>
+          <p:cNvPr id="7" name="Rectangle : coins arrondis 4">
+            <a:extLst>
+              <a:ext uri="{FF2B5EF4-FFF2-40B4-BE49-F238E27FC236}">
+                <a16:creationId xmlns:a16="http://schemas.microsoft.com/office/drawing/2014/main" id="{746AD914-379E-C1A5-2748-52566ECB017C}"/>
+              </a:ext>
+            </a:extLst>
+          </p:cNvPr>
+          <p:cNvSpPr/>
+          <p:nvPr/>
+        </p:nvSpPr>
+        <p:spPr>
+          <a:xfrm>
+            <a:off x="1819393" y="2585958"/>
+            <a:ext cx="195803" cy="166442"/>
+          </a:xfrm>
+          <a:prstGeom prst="roundRect">
+            <a:avLst/>
+          </a:prstGeom>
+          <a:solidFill>
+            <a:schemeClr val="accent5"/>
+          </a:solidFill>
+        </p:spPr>
+        <p:style>
+          <a:lnRef idx="2">
+            <a:schemeClr val="accent1">
+              <a:shade val="15000"/>
+            </a:schemeClr>
+          </a:lnRef>
+          <a:fillRef idx="1">
+            <a:schemeClr val="accent1"/>
+          </a:fillRef>
+          <a:effectRef idx="0">
+            <a:schemeClr val="accent1"/>
+          </a:effectRef>
+          <a:fontRef idx="minor">
+            <a:schemeClr val="lt1"/>
+          </a:fontRef>
+        </p:style>
+        <p:txBody>
+          <a:bodyPr rtlCol="0" anchor="ctr"/>
+          <a:lstStyle>
+            <a:defPPr>
+              <a:defRPr lang="fr-FR"/>
+            </a:defPPr>
+            <a:lvl1pPr marL="0" algn="l" defTabSz="914400" rtl="0" eaLnBrk="1" latinLnBrk="0" hangingPunct="1">
+              <a:defRPr sz="1800" kern="1200">
+                <a:solidFill>
+                  <a:schemeClr val="lt1"/>
+                </a:solidFill>
+                <a:latin typeface="+mn-lt"/>
+                <a:ea typeface="+mn-ea"/>
+                <a:cs typeface="+mn-cs"/>
+              </a:defRPr>
+            </a:lvl1pPr>
+            <a:lvl2pPr marL="457200" algn="l" defTabSz="914400" rtl="0" eaLnBrk="1" latinLnBrk="0" hangingPunct="1">
+              <a:defRPr sz="1800" kern="1200">
+                <a:solidFill>
+                  <a:schemeClr val="lt1"/>
+                </a:solidFill>
+                <a:latin typeface="+mn-lt"/>
+                <a:ea typeface="+mn-ea"/>
+                <a:cs typeface="+mn-cs"/>
+              </a:defRPr>
+            </a:lvl2pPr>
+            <a:lvl3pPr marL="914400" algn="l" defTabSz="914400" rtl="0" eaLnBrk="1" latinLnBrk="0" hangingPunct="1">
+              <a:defRPr sz="1800" kern="1200">
+                <a:solidFill>
+                  <a:schemeClr val="lt1"/>
+                </a:solidFill>
+                <a:latin typeface="+mn-lt"/>
+                <a:ea typeface="+mn-ea"/>
+                <a:cs typeface="+mn-cs"/>
+              </a:defRPr>
+            </a:lvl3pPr>
+            <a:lvl4pPr marL="1371600" algn="l" defTabSz="914400" rtl="0" eaLnBrk="1" latinLnBrk="0" hangingPunct="1">
+              <a:defRPr sz="1800" kern="1200">
+                <a:solidFill>
+                  <a:schemeClr val="lt1"/>
+                </a:solidFill>
+                <a:latin typeface="+mn-lt"/>
+                <a:ea typeface="+mn-ea"/>
+                <a:cs typeface="+mn-cs"/>
+              </a:defRPr>
+            </a:lvl4pPr>
+            <a:lvl5pPr marL="1828800" algn="l" defTabSz="914400" rtl="0" eaLnBrk="1" latinLnBrk="0" hangingPunct="1">
+              <a:defRPr sz="1800" kern="1200">
+                <a:solidFill>
+                  <a:schemeClr val="lt1"/>
+                </a:solidFill>
+                <a:latin typeface="+mn-lt"/>
+                <a:ea typeface="+mn-ea"/>
+                <a:cs typeface="+mn-cs"/>
+              </a:defRPr>
+            </a:lvl5pPr>
+            <a:lvl6pPr marL="2286000" algn="l" defTabSz="914400" rtl="0" eaLnBrk="1" latinLnBrk="0" hangingPunct="1">
+              <a:defRPr sz="1800" kern="1200">
+                <a:solidFill>
+                  <a:schemeClr val="lt1"/>
+                </a:solidFill>
+                <a:latin typeface="+mn-lt"/>
+                <a:ea typeface="+mn-ea"/>
+                <a:cs typeface="+mn-cs"/>
+              </a:defRPr>
+            </a:lvl6pPr>
+            <a:lvl7pPr marL="2743200" algn="l" defTabSz="914400" rtl="0" eaLnBrk="1" latinLnBrk="0" hangingPunct="1">
+              <a:defRPr sz="1800" kern="1200">
+                <a:solidFill>
+                  <a:schemeClr val="lt1"/>
+                </a:solidFill>
+                <a:latin typeface="+mn-lt"/>
+                <a:ea typeface="+mn-ea"/>
+                <a:cs typeface="+mn-cs"/>
+              </a:defRPr>
+            </a:lvl7pPr>
+            <a:lvl8pPr marL="3200400" algn="l" defTabSz="914400" rtl="0" eaLnBrk="1" latinLnBrk="0" hangingPunct="1">
+              <a:defRPr sz="1800" kern="1200">
+                <a:solidFill>
+                  <a:schemeClr val="lt1"/>
+                </a:solidFill>
+                <a:latin typeface="+mn-lt"/>
+                <a:ea typeface="+mn-ea"/>
+                <a:cs typeface="+mn-cs"/>
+              </a:defRPr>
+            </a:lvl8pPr>
+            <a:lvl9pPr marL="3657600" algn="l" defTabSz="914400" rtl="0" eaLnBrk="1" latinLnBrk="0" hangingPunct="1">
+              <a:defRPr sz="1800" kern="1200">
+                <a:solidFill>
+                  <a:schemeClr val="lt1"/>
+                </a:solidFill>
+                <a:latin typeface="+mn-lt"/>
+                <a:ea typeface="+mn-ea"/>
+                <a:cs typeface="+mn-cs"/>
+              </a:defRPr>
+            </a:lvl9pPr>
+          </a:lstStyle>
+          <a:p>
+            <a:pPr algn="ctr"/>
+            <a:r>
+              <a:rPr lang="fr-FR" sz="1400" dirty="0"/>
+              <a:t>3</a:t>
+            </a:r>
+          </a:p>
+        </p:txBody>
+      </p:sp>
+      <p:sp>
+        <p:nvSpPr>
+          <p:cNvPr id="14" name="Rectangle : coins arrondis 4">
+            <a:extLst>
+              <a:ext uri="{FF2B5EF4-FFF2-40B4-BE49-F238E27FC236}">
+                <a16:creationId xmlns:a16="http://schemas.microsoft.com/office/drawing/2014/main" id="{AADD42A7-CAA8-AFB2-D0D4-AC399C46E045}"/>
+              </a:ext>
+            </a:extLst>
+          </p:cNvPr>
+          <p:cNvSpPr/>
+          <p:nvPr/>
+        </p:nvSpPr>
+        <p:spPr>
+          <a:xfrm>
+            <a:off x="3497154" y="2855304"/>
+            <a:ext cx="195803" cy="166442"/>
+          </a:xfrm>
+          <a:prstGeom prst="roundRect">
+            <a:avLst/>
+          </a:prstGeom>
+          <a:solidFill>
+            <a:schemeClr val="accent5"/>
+          </a:solidFill>
+        </p:spPr>
+        <p:style>
+          <a:lnRef idx="2">
+            <a:schemeClr val="accent1">
+              <a:shade val="15000"/>
+            </a:schemeClr>
+          </a:lnRef>
+          <a:fillRef idx="1">
+            <a:schemeClr val="accent1"/>
+          </a:fillRef>
+          <a:effectRef idx="0">
+            <a:schemeClr val="accent1"/>
+          </a:effectRef>
+          <a:fontRef idx="minor">
+            <a:schemeClr val="lt1"/>
+          </a:fontRef>
+        </p:style>
+        <p:txBody>
+          <a:bodyPr rtlCol="0" anchor="ctr"/>
+          <a:lstStyle>
+            <a:defPPr>
+              <a:defRPr lang="fr-FR"/>
+            </a:defPPr>
+            <a:lvl1pPr marL="0" algn="l" defTabSz="914400" rtl="0" eaLnBrk="1" latinLnBrk="0" hangingPunct="1">
+              <a:defRPr sz="1800" kern="1200">
+                <a:solidFill>
+                  <a:schemeClr val="lt1"/>
+                </a:solidFill>
+                <a:latin typeface="+mn-lt"/>
+                <a:ea typeface="+mn-ea"/>
+                <a:cs typeface="+mn-cs"/>
+              </a:defRPr>
+            </a:lvl1pPr>
+            <a:lvl2pPr marL="457200" algn="l" defTabSz="914400" rtl="0" eaLnBrk="1" latinLnBrk="0" hangingPunct="1">
+              <a:defRPr sz="1800" kern="1200">
+                <a:solidFill>
+                  <a:schemeClr val="lt1"/>
+                </a:solidFill>
+                <a:latin typeface="+mn-lt"/>
+                <a:ea typeface="+mn-ea"/>
+                <a:cs typeface="+mn-cs"/>
+              </a:defRPr>
+            </a:lvl2pPr>
+            <a:lvl3pPr marL="914400" algn="l" defTabSz="914400" rtl="0" eaLnBrk="1" latinLnBrk="0" hangingPunct="1">
+              <a:defRPr sz="1800" kern="1200">
+                <a:solidFill>
+                  <a:schemeClr val="lt1"/>
+                </a:solidFill>
+                <a:latin typeface="+mn-lt"/>
+                <a:ea typeface="+mn-ea"/>
+                <a:cs typeface="+mn-cs"/>
+              </a:defRPr>
+            </a:lvl3pPr>
+            <a:lvl4pPr marL="1371600" algn="l" defTabSz="914400" rtl="0" eaLnBrk="1" latinLnBrk="0" hangingPunct="1">
+              <a:defRPr sz="1800" kern="1200">
+                <a:solidFill>
+                  <a:schemeClr val="lt1"/>
+                </a:solidFill>
+                <a:latin typeface="+mn-lt"/>
+                <a:ea typeface="+mn-ea"/>
+                <a:cs typeface="+mn-cs"/>
+              </a:defRPr>
+            </a:lvl4pPr>
+            <a:lvl5pPr marL="1828800" algn="l" defTabSz="914400" rtl="0" eaLnBrk="1" latinLnBrk="0" hangingPunct="1">
+              <a:defRPr sz="1800" kern="1200">
+                <a:solidFill>
+                  <a:schemeClr val="lt1"/>
+                </a:solidFill>
+                <a:latin typeface="+mn-lt"/>
+                <a:ea typeface="+mn-ea"/>
+                <a:cs typeface="+mn-cs"/>
+              </a:defRPr>
+            </a:lvl5pPr>
+            <a:lvl6pPr marL="2286000" algn="l" defTabSz="914400" rtl="0" eaLnBrk="1" latinLnBrk="0" hangingPunct="1">
+              <a:defRPr sz="1800" kern="1200">
+                <a:solidFill>
+                  <a:schemeClr val="lt1"/>
+                </a:solidFill>
+                <a:latin typeface="+mn-lt"/>
+                <a:ea typeface="+mn-ea"/>
+                <a:cs typeface="+mn-cs"/>
+              </a:defRPr>
+            </a:lvl6pPr>
+            <a:lvl7pPr marL="2743200" algn="l" defTabSz="914400" rtl="0" eaLnBrk="1" latinLnBrk="0" hangingPunct="1">
+              <a:defRPr sz="1800" kern="1200">
+                <a:solidFill>
+                  <a:schemeClr val="lt1"/>
+                </a:solidFill>
+                <a:latin typeface="+mn-lt"/>
+                <a:ea typeface="+mn-ea"/>
+                <a:cs typeface="+mn-cs"/>
+              </a:defRPr>
+            </a:lvl7pPr>
+            <a:lvl8pPr marL="3200400" algn="l" defTabSz="914400" rtl="0" eaLnBrk="1" latinLnBrk="0" hangingPunct="1">
+              <a:defRPr sz="1800" kern="1200">
+                <a:solidFill>
+                  <a:schemeClr val="lt1"/>
+                </a:solidFill>
+                <a:latin typeface="+mn-lt"/>
+                <a:ea typeface="+mn-ea"/>
+                <a:cs typeface="+mn-cs"/>
+              </a:defRPr>
+            </a:lvl8pPr>
+            <a:lvl9pPr marL="3657600" algn="l" defTabSz="914400" rtl="0" eaLnBrk="1" latinLnBrk="0" hangingPunct="1">
+              <a:defRPr sz="1800" kern="1200">
+                <a:solidFill>
+                  <a:schemeClr val="lt1"/>
+                </a:solidFill>
+                <a:latin typeface="+mn-lt"/>
+                <a:ea typeface="+mn-ea"/>
+                <a:cs typeface="+mn-cs"/>
+              </a:defRPr>
+            </a:lvl9pPr>
+          </a:lstStyle>
+          <a:p>
+            <a:pPr algn="ctr"/>
+            <a:r>
+              <a:rPr lang="fr-FR" sz="1400" dirty="0"/>
+              <a:t>4</a:t>
+            </a:r>
+          </a:p>
+        </p:txBody>
+      </p:sp>
+      <p:sp>
+        <p:nvSpPr>
+          <p:cNvPr id="15" name="Rectangle : coins arrondis 4">
+            <a:extLst>
+              <a:ext uri="{FF2B5EF4-FFF2-40B4-BE49-F238E27FC236}">
+                <a16:creationId xmlns:a16="http://schemas.microsoft.com/office/drawing/2014/main" id="{E59B3F70-B012-7B50-9E82-ED024538D2A8}"/>
+              </a:ext>
+            </a:extLst>
+          </p:cNvPr>
+          <p:cNvSpPr/>
+          <p:nvPr/>
+        </p:nvSpPr>
+        <p:spPr>
+          <a:xfrm>
+            <a:off x="9188385" y="2855304"/>
+            <a:ext cx="195803" cy="166442"/>
+          </a:xfrm>
+          <a:prstGeom prst="roundRect">
+            <a:avLst/>
+          </a:prstGeom>
+          <a:solidFill>
+            <a:schemeClr val="accent5"/>
+          </a:solidFill>
+        </p:spPr>
+        <p:style>
+          <a:lnRef idx="2">
+            <a:schemeClr val="accent1">
+              <a:shade val="15000"/>
+            </a:schemeClr>
+          </a:lnRef>
+          <a:fillRef idx="1">
+            <a:schemeClr val="accent1"/>
+          </a:fillRef>
+          <a:effectRef idx="0">
+            <a:schemeClr val="accent1"/>
+          </a:effectRef>
+          <a:fontRef idx="minor">
+            <a:schemeClr val="lt1"/>
+          </a:fontRef>
+        </p:style>
+        <p:txBody>
+          <a:bodyPr rtlCol="0" anchor="ctr"/>
+          <a:lstStyle>
+            <a:defPPr>
+              <a:defRPr lang="fr-FR"/>
+            </a:defPPr>
+            <a:lvl1pPr marL="0" algn="l" defTabSz="914400" rtl="0" eaLnBrk="1" latinLnBrk="0" hangingPunct="1">
+              <a:defRPr sz="1800" kern="1200">
+                <a:solidFill>
+                  <a:schemeClr val="lt1"/>
+                </a:solidFill>
+                <a:latin typeface="+mn-lt"/>
+                <a:ea typeface="+mn-ea"/>
+                <a:cs typeface="+mn-cs"/>
+              </a:defRPr>
+            </a:lvl1pPr>
+            <a:lvl2pPr marL="457200" algn="l" defTabSz="914400" rtl="0" eaLnBrk="1" latinLnBrk="0" hangingPunct="1">
+              <a:defRPr sz="1800" kern="1200">
+                <a:solidFill>
+                  <a:schemeClr val="lt1"/>
+                </a:solidFill>
+                <a:latin typeface="+mn-lt"/>
+                <a:ea typeface="+mn-ea"/>
+                <a:cs typeface="+mn-cs"/>
+              </a:defRPr>
+            </a:lvl2pPr>
+            <a:lvl3pPr marL="914400" algn="l" defTabSz="914400" rtl="0" eaLnBrk="1" latinLnBrk="0" hangingPunct="1">
+              <a:defRPr sz="1800" kern="1200">
+                <a:solidFill>
+                  <a:schemeClr val="lt1"/>
+                </a:solidFill>
+                <a:latin typeface="+mn-lt"/>
+                <a:ea typeface="+mn-ea"/>
+                <a:cs typeface="+mn-cs"/>
+              </a:defRPr>
+            </a:lvl3pPr>
+            <a:lvl4pPr marL="1371600" algn="l" defTabSz="914400" rtl="0" eaLnBrk="1" latinLnBrk="0" hangingPunct="1">
+              <a:defRPr sz="1800" kern="1200">
+                <a:solidFill>
+                  <a:schemeClr val="lt1"/>
+                </a:solidFill>
+                <a:latin typeface="+mn-lt"/>
+                <a:ea typeface="+mn-ea"/>
+                <a:cs typeface="+mn-cs"/>
+              </a:defRPr>
+            </a:lvl4pPr>
+            <a:lvl5pPr marL="1828800" algn="l" defTabSz="914400" rtl="0" eaLnBrk="1" latinLnBrk="0" hangingPunct="1">
+              <a:defRPr sz="1800" kern="1200">
+                <a:solidFill>
+                  <a:schemeClr val="lt1"/>
+                </a:solidFill>
+                <a:latin typeface="+mn-lt"/>
+                <a:ea typeface="+mn-ea"/>
+                <a:cs typeface="+mn-cs"/>
+              </a:defRPr>
+            </a:lvl5pPr>
+            <a:lvl6pPr marL="2286000" algn="l" defTabSz="914400" rtl="0" eaLnBrk="1" latinLnBrk="0" hangingPunct="1">
+              <a:defRPr sz="1800" kern="1200">
+                <a:solidFill>
+                  <a:schemeClr val="lt1"/>
+                </a:solidFill>
+                <a:latin typeface="+mn-lt"/>
+                <a:ea typeface="+mn-ea"/>
+                <a:cs typeface="+mn-cs"/>
+              </a:defRPr>
+            </a:lvl6pPr>
+            <a:lvl7pPr marL="2743200" algn="l" defTabSz="914400" rtl="0" eaLnBrk="1" latinLnBrk="0" hangingPunct="1">
+              <a:defRPr sz="1800" kern="1200">
+                <a:solidFill>
+                  <a:schemeClr val="lt1"/>
+                </a:solidFill>
+                <a:latin typeface="+mn-lt"/>
+                <a:ea typeface="+mn-ea"/>
+                <a:cs typeface="+mn-cs"/>
+              </a:defRPr>
+            </a:lvl7pPr>
+            <a:lvl8pPr marL="3200400" algn="l" defTabSz="914400" rtl="0" eaLnBrk="1" latinLnBrk="0" hangingPunct="1">
+              <a:defRPr sz="1800" kern="1200">
+                <a:solidFill>
+                  <a:schemeClr val="lt1"/>
+                </a:solidFill>
+                <a:latin typeface="+mn-lt"/>
+                <a:ea typeface="+mn-ea"/>
+                <a:cs typeface="+mn-cs"/>
+              </a:defRPr>
+            </a:lvl8pPr>
+            <a:lvl9pPr marL="3657600" algn="l" defTabSz="914400" rtl="0" eaLnBrk="1" latinLnBrk="0" hangingPunct="1">
+              <a:defRPr sz="1800" kern="1200">
+                <a:solidFill>
+                  <a:schemeClr val="lt1"/>
+                </a:solidFill>
+                <a:latin typeface="+mn-lt"/>
+                <a:ea typeface="+mn-ea"/>
+                <a:cs typeface="+mn-cs"/>
+              </a:defRPr>
+            </a:lvl9pPr>
+          </a:lstStyle>
+          <a:p>
+            <a:pPr algn="ctr"/>
+            <a:r>
+              <a:rPr lang="fr-FR" sz="1400" dirty="0"/>
+              <a:t>5</a:t>
+            </a:r>
+          </a:p>
+        </p:txBody>
+      </p:sp>
+      <p:sp>
+        <p:nvSpPr>
+          <p:cNvPr id="16" name="Rectangle : coins arrondis 4">
+            <a:extLst>
+              <a:ext uri="{FF2B5EF4-FFF2-40B4-BE49-F238E27FC236}">
+                <a16:creationId xmlns:a16="http://schemas.microsoft.com/office/drawing/2014/main" id="{15B922B3-FA3D-8742-9DB4-311D4F0F574F}"/>
+              </a:ext>
+            </a:extLst>
+          </p:cNvPr>
+          <p:cNvSpPr/>
+          <p:nvPr/>
+        </p:nvSpPr>
+        <p:spPr>
+          <a:xfrm>
+            <a:off x="2932308" y="5370740"/>
+            <a:ext cx="195803" cy="166442"/>
+          </a:xfrm>
+          <a:prstGeom prst="roundRect">
+            <a:avLst/>
+          </a:prstGeom>
+          <a:solidFill>
+            <a:schemeClr val="accent5"/>
+          </a:solidFill>
+        </p:spPr>
+        <p:style>
+          <a:lnRef idx="2">
+            <a:schemeClr val="accent1">
+              <a:shade val="15000"/>
+            </a:schemeClr>
+          </a:lnRef>
+          <a:fillRef idx="1">
+            <a:schemeClr val="accent1"/>
+          </a:fillRef>
+          <a:effectRef idx="0">
+            <a:schemeClr val="accent1"/>
+          </a:effectRef>
+          <a:fontRef idx="minor">
+            <a:schemeClr val="lt1"/>
+          </a:fontRef>
+        </p:style>
+        <p:txBody>
+          <a:bodyPr rtlCol="0" anchor="ctr"/>
+          <a:lstStyle>
+            <a:defPPr>
+              <a:defRPr lang="fr-FR"/>
+            </a:defPPr>
+            <a:lvl1pPr marL="0" algn="l" defTabSz="914400" rtl="0" eaLnBrk="1" latinLnBrk="0" hangingPunct="1">
+              <a:defRPr sz="1800" kern="1200">
+                <a:solidFill>
+                  <a:schemeClr val="lt1"/>
+                </a:solidFill>
+                <a:latin typeface="+mn-lt"/>
+                <a:ea typeface="+mn-ea"/>
+                <a:cs typeface="+mn-cs"/>
+              </a:defRPr>
+            </a:lvl1pPr>
+            <a:lvl2pPr marL="457200" algn="l" defTabSz="914400" rtl="0" eaLnBrk="1" latinLnBrk="0" hangingPunct="1">
+              <a:defRPr sz="1800" kern="1200">
+                <a:solidFill>
+                  <a:schemeClr val="lt1"/>
+                </a:solidFill>
+                <a:latin typeface="+mn-lt"/>
+                <a:ea typeface="+mn-ea"/>
+                <a:cs typeface="+mn-cs"/>
+              </a:defRPr>
+            </a:lvl2pPr>
+            <a:lvl3pPr marL="914400" algn="l" defTabSz="914400" rtl="0" eaLnBrk="1" latinLnBrk="0" hangingPunct="1">
+              <a:defRPr sz="1800" kern="1200">
+                <a:solidFill>
+                  <a:schemeClr val="lt1"/>
+                </a:solidFill>
+                <a:latin typeface="+mn-lt"/>
+                <a:ea typeface="+mn-ea"/>
+                <a:cs typeface="+mn-cs"/>
+              </a:defRPr>
+            </a:lvl3pPr>
+            <a:lvl4pPr marL="1371600" algn="l" defTabSz="914400" rtl="0" eaLnBrk="1" latinLnBrk="0" hangingPunct="1">
+              <a:defRPr sz="1800" kern="1200">
+                <a:solidFill>
+                  <a:schemeClr val="lt1"/>
+                </a:solidFill>
+                <a:latin typeface="+mn-lt"/>
+                <a:ea typeface="+mn-ea"/>
+                <a:cs typeface="+mn-cs"/>
+              </a:defRPr>
+            </a:lvl4pPr>
+            <a:lvl5pPr marL="1828800" algn="l" defTabSz="914400" rtl="0" eaLnBrk="1" latinLnBrk="0" hangingPunct="1">
+              <a:defRPr sz="1800" kern="1200">
+                <a:solidFill>
+                  <a:schemeClr val="lt1"/>
+                </a:solidFill>
+                <a:latin typeface="+mn-lt"/>
+                <a:ea typeface="+mn-ea"/>
+                <a:cs typeface="+mn-cs"/>
+              </a:defRPr>
+            </a:lvl5pPr>
+            <a:lvl6pPr marL="2286000" algn="l" defTabSz="914400" rtl="0" eaLnBrk="1" latinLnBrk="0" hangingPunct="1">
+              <a:defRPr sz="1800" kern="1200">
+                <a:solidFill>
+                  <a:schemeClr val="lt1"/>
+                </a:solidFill>
+                <a:latin typeface="+mn-lt"/>
+                <a:ea typeface="+mn-ea"/>
+                <a:cs typeface="+mn-cs"/>
+              </a:defRPr>
+            </a:lvl6pPr>
+            <a:lvl7pPr marL="2743200" algn="l" defTabSz="914400" rtl="0" eaLnBrk="1" latinLnBrk="0" hangingPunct="1">
+              <a:defRPr sz="1800" kern="1200">
+                <a:solidFill>
+                  <a:schemeClr val="lt1"/>
+                </a:solidFill>
+                <a:latin typeface="+mn-lt"/>
+                <a:ea typeface="+mn-ea"/>
+                <a:cs typeface="+mn-cs"/>
+              </a:defRPr>
+            </a:lvl7pPr>
+            <a:lvl8pPr marL="3200400" algn="l" defTabSz="914400" rtl="0" eaLnBrk="1" latinLnBrk="0" hangingPunct="1">
+              <a:defRPr sz="1800" kern="1200">
+                <a:solidFill>
+                  <a:schemeClr val="lt1"/>
+                </a:solidFill>
+                <a:latin typeface="+mn-lt"/>
+                <a:ea typeface="+mn-ea"/>
+                <a:cs typeface="+mn-cs"/>
+              </a:defRPr>
+            </a:lvl8pPr>
+            <a:lvl9pPr marL="3657600" algn="l" defTabSz="914400" rtl="0" eaLnBrk="1" latinLnBrk="0" hangingPunct="1">
+              <a:defRPr sz="1800" kern="1200">
+                <a:solidFill>
+                  <a:schemeClr val="lt1"/>
+                </a:solidFill>
+                <a:latin typeface="+mn-lt"/>
+                <a:ea typeface="+mn-ea"/>
+                <a:cs typeface="+mn-cs"/>
+              </a:defRPr>
+            </a:lvl9pPr>
+          </a:lstStyle>
+          <a:p>
+            <a:pPr algn="ctr"/>
+            <a:r>
+              <a:rPr lang="fr-FR" sz="1400" dirty="0"/>
+              <a:t>6</a:t>
+            </a:r>
+          </a:p>
+        </p:txBody>
+      </p:sp>
+      <p:sp>
+        <p:nvSpPr>
+          <p:cNvPr id="17" name="Rectangle : coins arrondis 4">
+            <a:extLst>
+              <a:ext uri="{FF2B5EF4-FFF2-40B4-BE49-F238E27FC236}">
+                <a16:creationId xmlns:a16="http://schemas.microsoft.com/office/drawing/2014/main" id="{419B3B5F-2F81-A21B-F9F8-16422FE9DCA0}"/>
+              </a:ext>
+            </a:extLst>
+          </p:cNvPr>
+          <p:cNvSpPr/>
+          <p:nvPr/>
+        </p:nvSpPr>
+        <p:spPr>
+          <a:xfrm>
+            <a:off x="5926953" y="5370740"/>
+            <a:ext cx="195803" cy="166442"/>
+          </a:xfrm>
+          <a:prstGeom prst="roundRect">
+            <a:avLst/>
+          </a:prstGeom>
+          <a:solidFill>
+            <a:schemeClr val="accent5"/>
+          </a:solidFill>
+        </p:spPr>
+        <p:style>
+          <a:lnRef idx="2">
+            <a:schemeClr val="accent1">
+              <a:shade val="15000"/>
+            </a:schemeClr>
+          </a:lnRef>
+          <a:fillRef idx="1">
+            <a:schemeClr val="accent1"/>
+          </a:fillRef>
+          <a:effectRef idx="0">
+            <a:schemeClr val="accent1"/>
+          </a:effectRef>
+          <a:fontRef idx="minor">
+            <a:schemeClr val="lt1"/>
+          </a:fontRef>
+        </p:style>
+        <p:txBody>
+          <a:bodyPr rtlCol="0" anchor="ctr"/>
+          <a:lstStyle>
+            <a:defPPr>
+              <a:defRPr lang="fr-FR"/>
+            </a:defPPr>
+            <a:lvl1pPr marL="0" algn="l" defTabSz="914400" rtl="0" eaLnBrk="1" latinLnBrk="0" hangingPunct="1">
+              <a:defRPr sz="1800" kern="1200">
+                <a:solidFill>
+                  <a:schemeClr val="lt1"/>
+                </a:solidFill>
+                <a:latin typeface="+mn-lt"/>
+                <a:ea typeface="+mn-ea"/>
+                <a:cs typeface="+mn-cs"/>
+              </a:defRPr>
+            </a:lvl1pPr>
+            <a:lvl2pPr marL="457200" algn="l" defTabSz="914400" rtl="0" eaLnBrk="1" latinLnBrk="0" hangingPunct="1">
+              <a:defRPr sz="1800" kern="1200">
+                <a:solidFill>
+                  <a:schemeClr val="lt1"/>
+                </a:solidFill>
+                <a:latin typeface="+mn-lt"/>
+                <a:ea typeface="+mn-ea"/>
+                <a:cs typeface="+mn-cs"/>
+              </a:defRPr>
+            </a:lvl2pPr>
+            <a:lvl3pPr marL="914400" algn="l" defTabSz="914400" rtl="0" eaLnBrk="1" latinLnBrk="0" hangingPunct="1">
+              <a:defRPr sz="1800" kern="1200">
+                <a:solidFill>
+                  <a:schemeClr val="lt1"/>
+                </a:solidFill>
+                <a:latin typeface="+mn-lt"/>
+                <a:ea typeface="+mn-ea"/>
+                <a:cs typeface="+mn-cs"/>
+              </a:defRPr>
+            </a:lvl3pPr>
+            <a:lvl4pPr marL="1371600" algn="l" defTabSz="914400" rtl="0" eaLnBrk="1" latinLnBrk="0" hangingPunct="1">
+              <a:defRPr sz="1800" kern="1200">
+                <a:solidFill>
+                  <a:schemeClr val="lt1"/>
+                </a:solidFill>
+                <a:latin typeface="+mn-lt"/>
+                <a:ea typeface="+mn-ea"/>
+                <a:cs typeface="+mn-cs"/>
+              </a:defRPr>
+            </a:lvl4pPr>
+            <a:lvl5pPr marL="1828800" algn="l" defTabSz="914400" rtl="0" eaLnBrk="1" latinLnBrk="0" hangingPunct="1">
+              <a:defRPr sz="1800" kern="1200">
+                <a:solidFill>
+                  <a:schemeClr val="lt1"/>
+                </a:solidFill>
+                <a:latin typeface="+mn-lt"/>
+                <a:ea typeface="+mn-ea"/>
+                <a:cs typeface="+mn-cs"/>
+              </a:defRPr>
+            </a:lvl5pPr>
+            <a:lvl6pPr marL="2286000" algn="l" defTabSz="914400" rtl="0" eaLnBrk="1" latinLnBrk="0" hangingPunct="1">
+              <a:defRPr sz="1800" kern="1200">
+                <a:solidFill>
+                  <a:schemeClr val="lt1"/>
+                </a:solidFill>
+                <a:latin typeface="+mn-lt"/>
+                <a:ea typeface="+mn-ea"/>
+                <a:cs typeface="+mn-cs"/>
+              </a:defRPr>
+            </a:lvl6pPr>
+            <a:lvl7pPr marL="2743200" algn="l" defTabSz="914400" rtl="0" eaLnBrk="1" latinLnBrk="0" hangingPunct="1">
+              <a:defRPr sz="1800" kern="1200">
+                <a:solidFill>
+                  <a:schemeClr val="lt1"/>
+                </a:solidFill>
+                <a:latin typeface="+mn-lt"/>
+                <a:ea typeface="+mn-ea"/>
+                <a:cs typeface="+mn-cs"/>
+              </a:defRPr>
+            </a:lvl7pPr>
+            <a:lvl8pPr marL="3200400" algn="l" defTabSz="914400" rtl="0" eaLnBrk="1" latinLnBrk="0" hangingPunct="1">
+              <a:defRPr sz="1800" kern="1200">
+                <a:solidFill>
+                  <a:schemeClr val="lt1"/>
+                </a:solidFill>
+                <a:latin typeface="+mn-lt"/>
+                <a:ea typeface="+mn-ea"/>
+                <a:cs typeface="+mn-cs"/>
+              </a:defRPr>
+            </a:lvl8pPr>
+            <a:lvl9pPr marL="3657600" algn="l" defTabSz="914400" rtl="0" eaLnBrk="1" latinLnBrk="0" hangingPunct="1">
+              <a:defRPr sz="1800" kern="1200">
+                <a:solidFill>
+                  <a:schemeClr val="lt1"/>
+                </a:solidFill>
+                <a:latin typeface="+mn-lt"/>
+                <a:ea typeface="+mn-ea"/>
+                <a:cs typeface="+mn-cs"/>
+              </a:defRPr>
+            </a:lvl9pPr>
+          </a:lstStyle>
+          <a:p>
+            <a:pPr algn="ctr"/>
+            <a:r>
+              <a:rPr lang="fr-FR" sz="1400" dirty="0"/>
+              <a:t>7</a:t>
+            </a:r>
+          </a:p>
+        </p:txBody>
+      </p:sp>
+      <p:sp>
+        <p:nvSpPr>
+          <p:cNvPr id="19" name="Rectangle 18">
+            <a:extLst>
+              <a:ext uri="{FF2B5EF4-FFF2-40B4-BE49-F238E27FC236}">
+                <a16:creationId xmlns:a16="http://schemas.microsoft.com/office/drawing/2014/main" id="{074DFCDA-699F-BF06-8AEF-8E48D12403D3}"/>
+              </a:ext>
+            </a:extLst>
+          </p:cNvPr>
+          <p:cNvSpPr/>
+          <p:nvPr/>
+        </p:nvSpPr>
+        <p:spPr>
+          <a:xfrm>
+            <a:off x="54977" y="596365"/>
+            <a:ext cx="395169" cy="360744"/>
+          </a:xfrm>
+          <a:prstGeom prst="rect">
+            <a:avLst/>
+          </a:prstGeom>
+          <a:noFill/>
+          <a:ln w="9525" cap="flat" cmpd="sng" algn="ctr">
+            <a:solidFill>
+              <a:schemeClr val="accent5"/>
+            </a:solidFill>
+            <a:prstDash val="solid"/>
+            <a:round/>
+            <a:headEnd type="none" w="med" len="med"/>
+            <a:tailEnd type="none" w="med" len="med"/>
+          </a:ln>
+        </p:spPr>
+        <p:style>
+          <a:lnRef idx="0">
+            <a:scrgbClr r="0" g="0" b="0"/>
+          </a:lnRef>
+          <a:fillRef idx="0">
+            <a:scrgbClr r="0" g="0" b="0"/>
+          </a:fillRef>
+          <a:effectRef idx="0">
+            <a:scrgbClr r="0" g="0" b="0"/>
+          </a:effectRef>
+          <a:fontRef idx="minor">
+            <a:schemeClr val="accent5"/>
+          </a:fontRef>
+        </p:style>
+        <p:txBody>
+          <a:bodyPr rtlCol="0" anchor="ctr"/>
+          <a:lstStyle/>
+          <a:p>
+            <a:pPr algn="ctr"/>
+            <a:endParaRPr lang="en-US"/>
+          </a:p>
+        </p:txBody>
+      </p:sp>
+      <p:sp>
+        <p:nvSpPr>
+          <p:cNvPr id="21" name="Rectangle 20">
+            <a:extLst>
+              <a:ext uri="{FF2B5EF4-FFF2-40B4-BE49-F238E27FC236}">
+                <a16:creationId xmlns:a16="http://schemas.microsoft.com/office/drawing/2014/main" id="{F7F1CE63-05A0-D143-B6FC-836DD6F094FA}"/>
+              </a:ext>
+            </a:extLst>
+          </p:cNvPr>
+          <p:cNvSpPr/>
+          <p:nvPr/>
+        </p:nvSpPr>
+        <p:spPr>
+          <a:xfrm>
+            <a:off x="-8491" y="2091193"/>
+            <a:ext cx="395169" cy="492981"/>
+          </a:xfrm>
+          <a:prstGeom prst="rect">
+            <a:avLst/>
+          </a:prstGeom>
+          <a:noFill/>
+          <a:ln w="9525" cap="flat" cmpd="sng" algn="ctr">
+            <a:solidFill>
+              <a:schemeClr val="accent5"/>
+            </a:solidFill>
+            <a:prstDash val="solid"/>
+            <a:round/>
+            <a:headEnd type="none" w="med" len="med"/>
+            <a:tailEnd type="none" w="med" len="med"/>
+          </a:ln>
+        </p:spPr>
+        <p:style>
+          <a:lnRef idx="0">
+            <a:scrgbClr r="0" g="0" b="0"/>
+          </a:lnRef>
+          <a:fillRef idx="0">
+            <a:scrgbClr r="0" g="0" b="0"/>
+          </a:fillRef>
+          <a:effectRef idx="0">
+            <a:scrgbClr r="0" g="0" b="0"/>
+          </a:effectRef>
+          <a:fontRef idx="minor">
+            <a:schemeClr val="accent5"/>
+          </a:fontRef>
+        </p:style>
+        <p:txBody>
+          <a:bodyPr rtlCol="0" anchor="ctr"/>
+          <a:lstStyle/>
+          <a:p>
+            <a:pPr algn="ctr"/>
+            <a:endParaRPr lang="en-US"/>
+          </a:p>
+        </p:txBody>
+      </p:sp>
+      <p:sp>
+        <p:nvSpPr>
+          <p:cNvPr id="23" name="Rectangle 22">
+            <a:extLst>
+              <a:ext uri="{FF2B5EF4-FFF2-40B4-BE49-F238E27FC236}">
+                <a16:creationId xmlns:a16="http://schemas.microsoft.com/office/drawing/2014/main" id="{3D052CDD-027C-E64D-2513-CE090C5D7C1E}"/>
+              </a:ext>
+            </a:extLst>
+          </p:cNvPr>
+          <p:cNvSpPr/>
+          <p:nvPr/>
+        </p:nvSpPr>
+        <p:spPr>
+          <a:xfrm>
+            <a:off x="522881" y="2526748"/>
+            <a:ext cx="1258211" cy="284158"/>
+          </a:xfrm>
+          <a:prstGeom prst="rect">
+            <a:avLst/>
+          </a:prstGeom>
+          <a:noFill/>
+          <a:ln w="9525" cap="flat" cmpd="sng" algn="ctr">
+            <a:solidFill>
+              <a:schemeClr val="accent5"/>
+            </a:solidFill>
+            <a:prstDash val="solid"/>
+            <a:round/>
+            <a:headEnd type="none" w="med" len="med"/>
+            <a:tailEnd type="none" w="med" len="med"/>
+          </a:ln>
+        </p:spPr>
+        <p:style>
+          <a:lnRef idx="0">
+            <a:scrgbClr r="0" g="0" b="0"/>
+          </a:lnRef>
+          <a:fillRef idx="0">
+            <a:scrgbClr r="0" g="0" b="0"/>
+          </a:fillRef>
+          <a:effectRef idx="0">
+            <a:scrgbClr r="0" g="0" b="0"/>
+          </a:effectRef>
+          <a:fontRef idx="minor">
+            <a:schemeClr val="accent5"/>
+          </a:fontRef>
+        </p:style>
+        <p:txBody>
+          <a:bodyPr rtlCol="0" anchor="ctr"/>
+          <a:lstStyle/>
+          <a:p>
+            <a:pPr algn="ctr"/>
+            <a:endParaRPr lang="en-US"/>
+          </a:p>
+        </p:txBody>
+      </p:sp>
+      <p:sp>
+        <p:nvSpPr>
+          <p:cNvPr id="2" name="Rectangle 1">
+            <a:extLst>
+              <a:ext uri="{FF2B5EF4-FFF2-40B4-BE49-F238E27FC236}">
+                <a16:creationId xmlns:a16="http://schemas.microsoft.com/office/drawing/2014/main" id="{9E601FBC-D226-B797-2A77-0B63805D4985}"/>
+              </a:ext>
+            </a:extLst>
+          </p:cNvPr>
+          <p:cNvSpPr/>
+          <p:nvPr/>
+        </p:nvSpPr>
+        <p:spPr>
+          <a:xfrm>
+            <a:off x="522881" y="3066143"/>
+            <a:ext cx="5730435" cy="1231181"/>
+          </a:xfrm>
+          <a:prstGeom prst="rect">
+            <a:avLst/>
+          </a:prstGeom>
+          <a:noFill/>
+          <a:ln w="9525" cap="flat" cmpd="sng" algn="ctr">
+            <a:solidFill>
+              <a:schemeClr val="accent5"/>
+            </a:solidFill>
+            <a:prstDash val="solid"/>
+            <a:round/>
+            <a:headEnd type="none" w="med" len="med"/>
+            <a:tailEnd type="none" w="med" len="med"/>
+          </a:ln>
+        </p:spPr>
+        <p:style>
+          <a:lnRef idx="0">
+            <a:scrgbClr r="0" g="0" b="0"/>
+          </a:lnRef>
+          <a:fillRef idx="0">
+            <a:scrgbClr r="0" g="0" b="0"/>
+          </a:fillRef>
+          <a:effectRef idx="0">
+            <a:scrgbClr r="0" g="0" b="0"/>
+          </a:effectRef>
+          <a:fontRef idx="minor">
+            <a:schemeClr val="accent5"/>
+          </a:fontRef>
+        </p:style>
+        <p:txBody>
+          <a:bodyPr rtlCol="0" anchor="ctr"/>
+          <a:lstStyle/>
+          <a:p>
+            <a:pPr algn="ctr"/>
+            <a:endParaRPr lang="en-US"/>
+          </a:p>
+        </p:txBody>
+      </p:sp>
+      <p:sp>
+        <p:nvSpPr>
+          <p:cNvPr id="5" name="Rectangle 4">
+            <a:extLst>
+              <a:ext uri="{FF2B5EF4-FFF2-40B4-BE49-F238E27FC236}">
+                <a16:creationId xmlns:a16="http://schemas.microsoft.com/office/drawing/2014/main" id="{90A585BD-EB80-6294-8E98-4850CB0E36FC}"/>
+              </a:ext>
+            </a:extLst>
+          </p:cNvPr>
+          <p:cNvSpPr/>
+          <p:nvPr/>
+        </p:nvSpPr>
+        <p:spPr>
+          <a:xfrm>
+            <a:off x="6323168" y="3066143"/>
+            <a:ext cx="5730434" cy="1231181"/>
+          </a:xfrm>
+          <a:prstGeom prst="rect">
+            <a:avLst/>
+          </a:prstGeom>
+          <a:noFill/>
+          <a:ln w="9525" cap="flat" cmpd="sng" algn="ctr">
+            <a:solidFill>
+              <a:schemeClr val="accent5"/>
+            </a:solidFill>
+            <a:prstDash val="solid"/>
+            <a:round/>
+            <a:headEnd type="none" w="med" len="med"/>
+            <a:tailEnd type="none" w="med" len="med"/>
+          </a:ln>
+        </p:spPr>
+        <p:style>
+          <a:lnRef idx="0">
+            <a:scrgbClr r="0" g="0" b="0"/>
+          </a:lnRef>
+          <a:fillRef idx="0">
+            <a:scrgbClr r="0" g="0" b="0"/>
+          </a:fillRef>
+          <a:effectRef idx="0">
+            <a:scrgbClr r="0" g="0" b="0"/>
+          </a:effectRef>
+          <a:fontRef idx="minor">
+            <a:schemeClr val="accent5"/>
+          </a:fontRef>
+        </p:style>
+        <p:txBody>
+          <a:bodyPr rtlCol="0" anchor="ctr"/>
+          <a:lstStyle/>
+          <a:p>
+            <a:pPr algn="ctr"/>
+            <a:endParaRPr lang="en-US"/>
+          </a:p>
+        </p:txBody>
+      </p:sp>
+      <p:sp>
+        <p:nvSpPr>
+          <p:cNvPr id="8" name="Rectangle 7">
+            <a:extLst>
+              <a:ext uri="{FF2B5EF4-FFF2-40B4-BE49-F238E27FC236}">
+                <a16:creationId xmlns:a16="http://schemas.microsoft.com/office/drawing/2014/main" id="{A742827C-CEA7-5F42-DAE3-119C647E401F}"/>
+              </a:ext>
+            </a:extLst>
+          </p:cNvPr>
+          <p:cNvSpPr/>
+          <p:nvPr/>
+        </p:nvSpPr>
+        <p:spPr>
+          <a:xfrm>
+            <a:off x="505123" y="4772879"/>
+            <a:ext cx="2665730" cy="797360"/>
+          </a:xfrm>
+          <a:prstGeom prst="rect">
+            <a:avLst/>
+          </a:prstGeom>
+          <a:noFill/>
+          <a:ln w="9525" cap="flat" cmpd="sng" algn="ctr">
+            <a:solidFill>
+              <a:schemeClr val="accent5"/>
+            </a:solidFill>
+            <a:prstDash val="solid"/>
+            <a:round/>
+            <a:headEnd type="none" w="med" len="med"/>
+            <a:tailEnd type="none" w="med" len="med"/>
+          </a:ln>
+        </p:spPr>
+        <p:style>
+          <a:lnRef idx="0">
+            <a:scrgbClr r="0" g="0" b="0"/>
+          </a:lnRef>
+          <a:fillRef idx="0">
+            <a:scrgbClr r="0" g="0" b="0"/>
+          </a:fillRef>
+          <a:effectRef idx="0">
+            <a:scrgbClr r="0" g="0" b="0"/>
+          </a:effectRef>
+          <a:fontRef idx="minor">
+            <a:schemeClr val="accent5"/>
+          </a:fontRef>
+        </p:style>
+        <p:txBody>
+          <a:bodyPr rtlCol="0" anchor="ctr"/>
+          <a:lstStyle/>
+          <a:p>
+            <a:pPr algn="ctr"/>
+            <a:endParaRPr lang="en-US"/>
+          </a:p>
+        </p:txBody>
+      </p:sp>
+      <p:sp>
+        <p:nvSpPr>
+          <p:cNvPr id="9" name="Rectangle 8">
+            <a:extLst>
+              <a:ext uri="{FF2B5EF4-FFF2-40B4-BE49-F238E27FC236}">
+                <a16:creationId xmlns:a16="http://schemas.microsoft.com/office/drawing/2014/main" id="{FD19CB46-19D8-9992-5990-0B762F06D3A0}"/>
+              </a:ext>
+            </a:extLst>
+          </p:cNvPr>
+          <p:cNvSpPr/>
+          <p:nvPr/>
+        </p:nvSpPr>
+        <p:spPr>
+          <a:xfrm>
+            <a:off x="4323998" y="4763578"/>
+            <a:ext cx="1841500" cy="797360"/>
+          </a:xfrm>
+          <a:prstGeom prst="rect">
+            <a:avLst/>
+          </a:prstGeom>
+          <a:noFill/>
+          <a:ln w="9525" cap="flat" cmpd="sng" algn="ctr">
+            <a:solidFill>
+              <a:schemeClr val="accent5"/>
+            </a:solidFill>
+            <a:prstDash val="solid"/>
+            <a:round/>
+            <a:headEnd type="none" w="med" len="med"/>
+            <a:tailEnd type="none" w="med" len="med"/>
+          </a:ln>
+        </p:spPr>
+        <p:style>
+          <a:lnRef idx="0">
+            <a:scrgbClr r="0" g="0" b="0"/>
+          </a:lnRef>
+          <a:fillRef idx="0">
+            <a:scrgbClr r="0" g="0" b="0"/>
+          </a:fillRef>
+          <a:effectRef idx="0">
+            <a:scrgbClr r="0" g="0" b="0"/>
+          </a:effectRef>
+          <a:fontRef idx="minor">
+            <a:schemeClr val="accent5"/>
+          </a:fontRef>
+        </p:style>
+        <p:txBody>
+          <a:bodyPr rtlCol="0" anchor="ctr"/>
+          <a:lstStyle/>
+          <a:p>
+            <a:pPr algn="ctr"/>
+            <a:endParaRPr lang="en-US"/>
+          </a:p>
+        </p:txBody>
+      </p:sp>
+      <p:sp>
+        <p:nvSpPr>
+          <p:cNvPr id="18" name="Rectangle 17">
+            <a:extLst>
+              <a:ext uri="{FF2B5EF4-FFF2-40B4-BE49-F238E27FC236}">
+                <a16:creationId xmlns:a16="http://schemas.microsoft.com/office/drawing/2014/main" id="{FFCA4DB8-FE5D-3924-EE59-27270EF761CC}"/>
+              </a:ext>
+            </a:extLst>
+          </p:cNvPr>
+          <p:cNvSpPr/>
+          <p:nvPr/>
+        </p:nvSpPr>
+        <p:spPr>
+          <a:xfrm>
+            <a:off x="8195765" y="4714858"/>
+            <a:ext cx="1711560" cy="894799"/>
+          </a:xfrm>
+          <a:prstGeom prst="rect">
+            <a:avLst/>
+          </a:prstGeom>
+          <a:noFill/>
+          <a:ln w="9525" cap="flat" cmpd="sng" algn="ctr">
+            <a:solidFill>
+              <a:schemeClr val="accent5"/>
+            </a:solidFill>
+            <a:prstDash val="solid"/>
+            <a:round/>
+            <a:headEnd type="none" w="med" len="med"/>
+            <a:tailEnd type="none" w="med" len="med"/>
+          </a:ln>
+        </p:spPr>
+        <p:style>
+          <a:lnRef idx="0">
+            <a:scrgbClr r="0" g="0" b="0"/>
+          </a:lnRef>
+          <a:fillRef idx="0">
+            <a:scrgbClr r="0" g="0" b="0"/>
+          </a:fillRef>
+          <a:effectRef idx="0">
+            <a:scrgbClr r="0" g="0" b="0"/>
+          </a:effectRef>
+          <a:fontRef idx="minor">
+            <a:schemeClr val="accent5"/>
+          </a:fontRef>
+        </p:style>
+        <p:txBody>
+          <a:bodyPr rtlCol="0" anchor="ctr"/>
+          <a:lstStyle/>
+          <a:p>
+            <a:pPr algn="ctr"/>
+            <a:endParaRPr lang="en-US"/>
+          </a:p>
+        </p:txBody>
+      </p:sp>
+      <p:sp>
+        <p:nvSpPr>
+          <p:cNvPr id="22" name="Rectangle : coins arrondis 4">
+            <a:extLst>
+              <a:ext uri="{FF2B5EF4-FFF2-40B4-BE49-F238E27FC236}">
+                <a16:creationId xmlns:a16="http://schemas.microsoft.com/office/drawing/2014/main" id="{9E639892-CEC8-D5EB-57AE-C5FFDFA1DC2F}"/>
+              </a:ext>
+            </a:extLst>
+          </p:cNvPr>
+          <p:cNvSpPr/>
+          <p:nvPr/>
+        </p:nvSpPr>
+        <p:spPr>
+          <a:xfrm>
+            <a:off x="9651630" y="5403797"/>
+            <a:ext cx="195803" cy="166442"/>
+          </a:xfrm>
+          <a:prstGeom prst="roundRect">
+            <a:avLst/>
+          </a:prstGeom>
+          <a:solidFill>
+            <a:schemeClr val="accent5"/>
+          </a:solidFill>
+        </p:spPr>
+        <p:style>
+          <a:lnRef idx="2">
+            <a:schemeClr val="accent1">
+              <a:shade val="15000"/>
+            </a:schemeClr>
+          </a:lnRef>
+          <a:fillRef idx="1">
+            <a:schemeClr val="accent1"/>
+          </a:fillRef>
+          <a:effectRef idx="0">
+            <a:schemeClr val="accent1"/>
+          </a:effectRef>
+          <a:fontRef idx="minor">
+            <a:schemeClr val="lt1"/>
+          </a:fontRef>
+        </p:style>
+        <p:txBody>
+          <a:bodyPr rtlCol="0" anchor="ctr"/>
+          <a:lstStyle>
+            <a:defPPr>
+              <a:defRPr lang="fr-FR"/>
+            </a:defPPr>
+            <a:lvl1pPr marL="0" algn="l" defTabSz="914400" rtl="0" eaLnBrk="1" latinLnBrk="0" hangingPunct="1">
+              <a:defRPr sz="1800" kern="1200">
+                <a:solidFill>
+                  <a:schemeClr val="lt1"/>
+                </a:solidFill>
+                <a:latin typeface="+mn-lt"/>
+                <a:ea typeface="+mn-ea"/>
+                <a:cs typeface="+mn-cs"/>
+              </a:defRPr>
+            </a:lvl1pPr>
+            <a:lvl2pPr marL="457200" algn="l" defTabSz="914400" rtl="0" eaLnBrk="1" latinLnBrk="0" hangingPunct="1">
+              <a:defRPr sz="1800" kern="1200">
+                <a:solidFill>
+                  <a:schemeClr val="lt1"/>
+                </a:solidFill>
+                <a:latin typeface="+mn-lt"/>
+                <a:ea typeface="+mn-ea"/>
+                <a:cs typeface="+mn-cs"/>
+              </a:defRPr>
+            </a:lvl2pPr>
+            <a:lvl3pPr marL="914400" algn="l" defTabSz="914400" rtl="0" eaLnBrk="1" latinLnBrk="0" hangingPunct="1">
+              <a:defRPr sz="1800" kern="1200">
+                <a:solidFill>
+                  <a:schemeClr val="lt1"/>
+                </a:solidFill>
+                <a:latin typeface="+mn-lt"/>
+                <a:ea typeface="+mn-ea"/>
+                <a:cs typeface="+mn-cs"/>
+              </a:defRPr>
+            </a:lvl3pPr>
+            <a:lvl4pPr marL="1371600" algn="l" defTabSz="914400" rtl="0" eaLnBrk="1" latinLnBrk="0" hangingPunct="1">
+              <a:defRPr sz="1800" kern="1200">
+                <a:solidFill>
+                  <a:schemeClr val="lt1"/>
+                </a:solidFill>
+                <a:latin typeface="+mn-lt"/>
+                <a:ea typeface="+mn-ea"/>
+                <a:cs typeface="+mn-cs"/>
+              </a:defRPr>
+            </a:lvl4pPr>
+            <a:lvl5pPr marL="1828800" algn="l" defTabSz="914400" rtl="0" eaLnBrk="1" latinLnBrk="0" hangingPunct="1">
+              <a:defRPr sz="1800" kern="1200">
+                <a:solidFill>
+                  <a:schemeClr val="lt1"/>
+                </a:solidFill>
+                <a:latin typeface="+mn-lt"/>
+                <a:ea typeface="+mn-ea"/>
+                <a:cs typeface="+mn-cs"/>
+              </a:defRPr>
+            </a:lvl5pPr>
+            <a:lvl6pPr marL="2286000" algn="l" defTabSz="914400" rtl="0" eaLnBrk="1" latinLnBrk="0" hangingPunct="1">
+              <a:defRPr sz="1800" kern="1200">
+                <a:solidFill>
+                  <a:schemeClr val="lt1"/>
+                </a:solidFill>
+                <a:latin typeface="+mn-lt"/>
+                <a:ea typeface="+mn-ea"/>
+                <a:cs typeface="+mn-cs"/>
+              </a:defRPr>
+            </a:lvl6pPr>
+            <a:lvl7pPr marL="2743200" algn="l" defTabSz="914400" rtl="0" eaLnBrk="1" latinLnBrk="0" hangingPunct="1">
+              <a:defRPr sz="1800" kern="1200">
+                <a:solidFill>
+                  <a:schemeClr val="lt1"/>
+                </a:solidFill>
+                <a:latin typeface="+mn-lt"/>
+                <a:ea typeface="+mn-ea"/>
+                <a:cs typeface="+mn-cs"/>
+              </a:defRPr>
+            </a:lvl7pPr>
+            <a:lvl8pPr marL="3200400" algn="l" defTabSz="914400" rtl="0" eaLnBrk="1" latinLnBrk="0" hangingPunct="1">
+              <a:defRPr sz="1800" kern="1200">
+                <a:solidFill>
+                  <a:schemeClr val="lt1"/>
+                </a:solidFill>
+                <a:latin typeface="+mn-lt"/>
+                <a:ea typeface="+mn-ea"/>
+                <a:cs typeface="+mn-cs"/>
+              </a:defRPr>
+            </a:lvl8pPr>
+            <a:lvl9pPr marL="3657600" algn="l" defTabSz="914400" rtl="0" eaLnBrk="1" latinLnBrk="0" hangingPunct="1">
+              <a:defRPr sz="1800" kern="1200">
+                <a:solidFill>
+                  <a:schemeClr val="lt1"/>
+                </a:solidFill>
+                <a:latin typeface="+mn-lt"/>
+                <a:ea typeface="+mn-ea"/>
+                <a:cs typeface="+mn-cs"/>
+              </a:defRPr>
+            </a:lvl9pPr>
+          </a:lstStyle>
+          <a:p>
+            <a:pPr algn="ctr"/>
+            <a:r>
+              <a:rPr lang="fr-FR" sz="1400" dirty="0"/>
+              <a:t>8</a:t>
+            </a:r>
+          </a:p>
+        </p:txBody>
+      </p:sp>
     </p:spTree>
     <p:extLst>
       <p:ext uri="{BB962C8B-B14F-4D97-AF65-F5344CB8AC3E}">
-        <p14:creationId xmlns:p14="http://schemas.microsoft.com/office/powerpoint/2010/main" val="445357303"/>
+        <p14:creationId xmlns:p14="http://schemas.microsoft.com/office/powerpoint/2010/main" val="3980770116"/>
       </p:ext>
     </p:extLst>
   </p:cSld>
@@ -5086,7 +6698,13 @@
   <p:cSld>
     <p:spTree>
       <p:nvGrpSpPr>
-        <p:cNvPr id="1" name=""/>
+        <p:cNvPr id="1" name="">
+          <a:extLst>
+            <a:ext uri="{FF2B5EF4-FFF2-40B4-BE49-F238E27FC236}">
+              <a16:creationId xmlns:a16="http://schemas.microsoft.com/office/drawing/2014/main" id="{D01A0FDC-E161-989C-223A-71CFA02B9ABC}"/>
+            </a:ext>
+          </a:extLst>
+        </p:cNvPr>
         <p:cNvGrpSpPr/>
         <p:nvPr/>
       </p:nvGrpSpPr>
@@ -5100,10 +6718,10 @@
       </p:grpSpPr>
       <p:pic>
         <p:nvPicPr>
-          <p:cNvPr id="5" name="Picture 4">
-            <a:extLst>
-              <a:ext uri="{FF2B5EF4-FFF2-40B4-BE49-F238E27FC236}">
-                <a16:creationId xmlns:a16="http://schemas.microsoft.com/office/drawing/2014/main" id="{BB3DE0B2-5FA6-E703-78EE-D4760FA47A98}"/>
+          <p:cNvPr id="3" name="Picture 2" descr="A screenshot of a computer&#10;&#10;AI-generated content may be incorrect.">
+            <a:extLst>
+              <a:ext uri="{FF2B5EF4-FFF2-40B4-BE49-F238E27FC236}">
+                <a16:creationId xmlns:a16="http://schemas.microsoft.com/office/drawing/2014/main" id="{B8EDA1E0-BFB8-7CA1-FBB1-E7C90DBA8C6F}"/>
               </a:ext>
             </a:extLst>
           </p:cNvPr>
@@ -5113,15 +6731,21 @@
           <p:nvPr/>
         </p:nvPicPr>
         <p:blipFill>
-          <a:blip r:embed="rId2"/>
+          <a:blip r:embed="rId2">
+            <a:extLst>
+              <a:ext uri="{28A0092B-C50C-407E-A947-70E740481C1C}">
+                <a14:useLocalDpi xmlns:a14="http://schemas.microsoft.com/office/drawing/2010/main" val="0"/>
+              </a:ext>
+            </a:extLst>
+          </a:blip>
           <a:stretch>
             <a:fillRect/>
           </a:stretch>
         </p:blipFill>
         <p:spPr>
           <a:xfrm>
-            <a:off x="6037" y="6174"/>
-            <a:ext cx="12179926" cy="6845652"/>
+            <a:off x="0" y="228600"/>
+            <a:ext cx="12192000" cy="6400800"/>
           </a:xfrm>
           <a:prstGeom prst="rect">
             <a:avLst/>
@@ -5131,7 +6755,78 @@
     </p:spTree>
     <p:extLst>
       <p:ext uri="{BB962C8B-B14F-4D97-AF65-F5344CB8AC3E}">
-        <p14:creationId xmlns:p14="http://schemas.microsoft.com/office/powerpoint/2010/main" val="1922464466"/>
+        <p14:creationId xmlns:p14="http://schemas.microsoft.com/office/powerpoint/2010/main" val="1316571969"/>
+      </p:ext>
+    </p:extLst>
+  </p:cSld>
+  <p:clrMapOvr>
+    <a:masterClrMapping/>
+  </p:clrMapOvr>
+</p:sld>
+</file>
+
+<file path=ppt/slides/slide4.xml><?xml version="1.0" encoding="utf-8"?>
+<p:sld xmlns:a="http://schemas.openxmlformats.org/drawingml/2006/main" xmlns:r="http://schemas.openxmlformats.org/officeDocument/2006/relationships" xmlns:p="http://schemas.openxmlformats.org/presentationml/2006/main">
+  <p:cSld>
+    <p:spTree>
+      <p:nvGrpSpPr>
+        <p:cNvPr id="1" name="">
+          <a:extLst>
+            <a:ext uri="{FF2B5EF4-FFF2-40B4-BE49-F238E27FC236}">
+              <a16:creationId xmlns:a16="http://schemas.microsoft.com/office/drawing/2014/main" id="{06D05069-90B2-DD8A-8302-FEA92CB331D3}"/>
+            </a:ext>
+          </a:extLst>
+        </p:cNvPr>
+        <p:cNvGrpSpPr/>
+        <p:nvPr/>
+      </p:nvGrpSpPr>
+      <p:grpSpPr>
+        <a:xfrm>
+          <a:off x="0" y="0"/>
+          <a:ext cx="0" cy="0"/>
+          <a:chOff x="0" y="0"/>
+          <a:chExt cx="0" cy="0"/>
+        </a:xfrm>
+      </p:grpSpPr>
+      <p:pic>
+        <p:nvPicPr>
+          <p:cNvPr id="3" name="Picture 2" descr="A screenshot of a computer&#10;&#10;AI-generated content may be incorrect.">
+            <a:extLst>
+              <a:ext uri="{FF2B5EF4-FFF2-40B4-BE49-F238E27FC236}">
+                <a16:creationId xmlns:a16="http://schemas.microsoft.com/office/drawing/2014/main" id="{E015C767-0C77-B374-FECF-950C5768B06F}"/>
+              </a:ext>
+            </a:extLst>
+          </p:cNvPr>
+          <p:cNvPicPr>
+            <a:picLocks noChangeAspect="1"/>
+          </p:cNvPicPr>
+          <p:nvPr/>
+        </p:nvPicPr>
+        <p:blipFill>
+          <a:blip r:embed="rId2">
+            <a:extLst>
+              <a:ext uri="{28A0092B-C50C-407E-A947-70E740481C1C}">
+                <a14:useLocalDpi xmlns:a14="http://schemas.microsoft.com/office/drawing/2010/main" val="0"/>
+              </a:ext>
+            </a:extLst>
+          </a:blip>
+          <a:srcRect t="18197"/>
+          <a:stretch/>
+        </p:blipFill>
+        <p:spPr>
+          <a:xfrm>
+            <a:off x="0" y="1393370"/>
+            <a:ext cx="12192000" cy="5236029"/>
+          </a:xfrm>
+          <a:prstGeom prst="rect">
+            <a:avLst/>
+          </a:prstGeom>
+        </p:spPr>
+      </p:pic>
+    </p:spTree>
+    <p:extLst>
+      <p:ext uri="{BB962C8B-B14F-4D97-AF65-F5344CB8AC3E}">
+        <p14:creationId xmlns:p14="http://schemas.microsoft.com/office/powerpoint/2010/main" val="3127228754"/>
       </p:ext>
     </p:extLst>
   </p:cSld>

</xml_diff>